<commit_message>
Neue Version mit Felix-Hottie Bild
</commit_message>
<xml_diff>
--- a/Material für Abschlusspräsentation/GrobeArchitektur plus Bilder wer was gemacht hat.pptx
+++ b/Material für Abschlusspräsentation/GrobeArchitektur plus Bilder wer was gemacht hat.pptx
@@ -259,7 +259,7 @@
           <a:p>
             <a:fld id="{53BF1147-FA7A-4B52-AF0A-F04FF8B75832}" type="datetimeFigureOut">
               <a:rPr lang="de-DE" smtClean="0"/>
-              <a:t>16.07.2020</a:t>
+              <a:t>21.07.2020</a:t>
             </a:fld>
             <a:endParaRPr lang="de-DE"/>
           </a:p>
@@ -457,7 +457,7 @@
           <a:p>
             <a:fld id="{53BF1147-FA7A-4B52-AF0A-F04FF8B75832}" type="datetimeFigureOut">
               <a:rPr lang="de-DE" smtClean="0"/>
-              <a:t>16.07.2020</a:t>
+              <a:t>21.07.2020</a:t>
             </a:fld>
             <a:endParaRPr lang="de-DE"/>
           </a:p>
@@ -665,7 +665,7 @@
           <a:p>
             <a:fld id="{53BF1147-FA7A-4B52-AF0A-F04FF8B75832}" type="datetimeFigureOut">
               <a:rPr lang="de-DE" smtClean="0"/>
-              <a:t>16.07.2020</a:t>
+              <a:t>21.07.2020</a:t>
             </a:fld>
             <a:endParaRPr lang="de-DE"/>
           </a:p>
@@ -863,7 +863,7 @@
           <a:p>
             <a:fld id="{53BF1147-FA7A-4B52-AF0A-F04FF8B75832}" type="datetimeFigureOut">
               <a:rPr lang="de-DE" smtClean="0"/>
-              <a:t>16.07.2020</a:t>
+              <a:t>21.07.2020</a:t>
             </a:fld>
             <a:endParaRPr lang="de-DE"/>
           </a:p>
@@ -1138,7 +1138,7 @@
           <a:p>
             <a:fld id="{53BF1147-FA7A-4B52-AF0A-F04FF8B75832}" type="datetimeFigureOut">
               <a:rPr lang="de-DE" smtClean="0"/>
-              <a:t>16.07.2020</a:t>
+              <a:t>21.07.2020</a:t>
             </a:fld>
             <a:endParaRPr lang="de-DE"/>
           </a:p>
@@ -1403,7 +1403,7 @@
           <a:p>
             <a:fld id="{53BF1147-FA7A-4B52-AF0A-F04FF8B75832}" type="datetimeFigureOut">
               <a:rPr lang="de-DE" smtClean="0"/>
-              <a:t>16.07.2020</a:t>
+              <a:t>21.07.2020</a:t>
             </a:fld>
             <a:endParaRPr lang="de-DE"/>
           </a:p>
@@ -1815,7 +1815,7 @@
           <a:p>
             <a:fld id="{53BF1147-FA7A-4B52-AF0A-F04FF8B75832}" type="datetimeFigureOut">
               <a:rPr lang="de-DE" smtClean="0"/>
-              <a:t>16.07.2020</a:t>
+              <a:t>21.07.2020</a:t>
             </a:fld>
             <a:endParaRPr lang="de-DE"/>
           </a:p>
@@ -1956,7 +1956,7 @@
           <a:p>
             <a:fld id="{53BF1147-FA7A-4B52-AF0A-F04FF8B75832}" type="datetimeFigureOut">
               <a:rPr lang="de-DE" smtClean="0"/>
-              <a:t>16.07.2020</a:t>
+              <a:t>21.07.2020</a:t>
             </a:fld>
             <a:endParaRPr lang="de-DE"/>
           </a:p>
@@ -2069,7 +2069,7 @@
           <a:p>
             <a:fld id="{53BF1147-FA7A-4B52-AF0A-F04FF8B75832}" type="datetimeFigureOut">
               <a:rPr lang="de-DE" smtClean="0"/>
-              <a:t>16.07.2020</a:t>
+              <a:t>21.07.2020</a:t>
             </a:fld>
             <a:endParaRPr lang="de-DE"/>
           </a:p>
@@ -2380,7 +2380,7 @@
           <a:p>
             <a:fld id="{53BF1147-FA7A-4B52-AF0A-F04FF8B75832}" type="datetimeFigureOut">
               <a:rPr lang="de-DE" smtClean="0"/>
-              <a:t>16.07.2020</a:t>
+              <a:t>21.07.2020</a:t>
             </a:fld>
             <a:endParaRPr lang="de-DE"/>
           </a:p>
@@ -2668,7 +2668,7 @@
           <a:p>
             <a:fld id="{53BF1147-FA7A-4B52-AF0A-F04FF8B75832}" type="datetimeFigureOut">
               <a:rPr lang="de-DE" smtClean="0"/>
-              <a:t>16.07.2020</a:t>
+              <a:t>21.07.2020</a:t>
             </a:fld>
             <a:endParaRPr lang="de-DE"/>
           </a:p>
@@ -2909,7 +2909,7 @@
           <a:p>
             <a:fld id="{53BF1147-FA7A-4B52-AF0A-F04FF8B75832}" type="datetimeFigureOut">
               <a:rPr lang="de-DE" smtClean="0"/>
-              <a:t>16.07.2020</a:t>
+              <a:t>21.07.2020</a:t>
             </a:fld>
             <a:endParaRPr lang="de-DE"/>
           </a:p>
@@ -5254,42 +5254,6 @@
           </a:p>
         </p:txBody>
       </p:sp>
-      <p:pic>
-        <p:nvPicPr>
-          <p:cNvPr id="4" name="Grafik 3">
-            <a:extLst>
-              <a:ext uri="{FF2B5EF4-FFF2-40B4-BE49-F238E27FC236}">
-                <a16:creationId xmlns:a16="http://schemas.microsoft.com/office/drawing/2014/main" id="{286D964B-461E-4EE9-A360-02DA1BE3C050}"/>
-              </a:ext>
-            </a:extLst>
-          </p:cNvPr>
-          <p:cNvPicPr>
-            <a:picLocks noChangeAspect="1"/>
-          </p:cNvPicPr>
-          <p:nvPr/>
-        </p:nvPicPr>
-        <p:blipFill>
-          <a:blip r:embed="rId2">
-            <a:extLst>
-              <a:ext uri="{28A0092B-C50C-407E-A947-70E740481C1C}">
-                <a14:useLocalDpi xmlns:a14="http://schemas.microsoft.com/office/drawing/2010/main" val="0"/>
-              </a:ext>
-            </a:extLst>
-          </a:blip>
-          <a:stretch>
-            <a:fillRect/>
-          </a:stretch>
-        </p:blipFill>
-        <p:spPr>
-          <a:xfrm>
-            <a:off x="6742452" y="199792"/>
-            <a:ext cx="1011365" cy="1346243"/>
-          </a:xfrm>
-          <a:prstGeom prst="rect">
-            <a:avLst/>
-          </a:prstGeom>
-        </p:spPr>
-      </p:pic>
       <p:cxnSp>
         <p:nvCxnSpPr>
           <p:cNvPr id="6" name="Gerader Verbinder 5">
@@ -5301,7 +5265,6 @@
           </p:cNvPr>
           <p:cNvCxnSpPr>
             <a:cxnSpLocks/>
-            <a:stCxn id="4" idx="0"/>
             <a:endCxn id="50" idx="0"/>
           </p:cNvCxnSpPr>
           <p:nvPr/>
@@ -5350,7 +5313,7 @@
           <p:nvPr/>
         </p:nvPicPr>
         <p:blipFill rotWithShape="1">
-          <a:blip r:embed="rId3">
+          <a:blip r:embed="rId2">
             <a:extLst>
               <a:ext uri="{28A0092B-C50C-407E-A947-70E740481C1C}">
                 <a14:useLocalDpi xmlns:a14="http://schemas.microsoft.com/office/drawing/2010/main" val="0"/>
@@ -5475,7 +5438,7 @@
           <p:nvPr/>
         </p:nvPicPr>
         <p:blipFill>
-          <a:blip r:embed="rId4">
+          <a:blip r:embed="rId3">
             <a:extLst>
               <a:ext uri="{28A0092B-C50C-407E-A947-70E740481C1C}">
                 <a14:useLocalDpi xmlns:a14="http://schemas.microsoft.com/office/drawing/2010/main" val="0"/>
@@ -5601,7 +5564,7 @@
           <p:nvPr/>
         </p:nvPicPr>
         <p:blipFill>
-          <a:blip r:embed="rId5">
+          <a:blip r:embed="rId4">
             <a:extLst>
               <a:ext uri="{28A0092B-C50C-407E-A947-70E740481C1C}">
                 <a14:useLocalDpi xmlns:a14="http://schemas.microsoft.com/office/drawing/2010/main" val="0"/>
@@ -5682,7 +5645,7 @@
           <p:nvPr/>
         </p:nvPicPr>
         <p:blipFill rotWithShape="1">
-          <a:blip r:embed="rId6">
+          <a:blip r:embed="rId5">
             <a:extLst>
               <a:ext uri="{28A0092B-C50C-407E-A947-70E740481C1C}">
                 <a14:useLocalDpi xmlns:a14="http://schemas.microsoft.com/office/drawing/2010/main" val="0"/>
@@ -5747,6 +5710,42 @@
           </a:fontRef>
         </p:style>
       </p:cxnSp>
+      <p:pic>
+        <p:nvPicPr>
+          <p:cNvPr id="5" name="Grafik 4">
+            <a:extLst>
+              <a:ext uri="{FF2B5EF4-FFF2-40B4-BE49-F238E27FC236}">
+                <a16:creationId xmlns:a16="http://schemas.microsoft.com/office/drawing/2014/main" id="{24250608-BAD8-4583-9BF7-239BA19219D3}"/>
+              </a:ext>
+            </a:extLst>
+          </p:cNvPr>
+          <p:cNvPicPr>
+            <a:picLocks noChangeAspect="1"/>
+          </p:cNvPicPr>
+          <p:nvPr/>
+        </p:nvPicPr>
+        <p:blipFill>
+          <a:blip r:embed="rId6">
+            <a:extLst>
+              <a:ext uri="{28A0092B-C50C-407E-A947-70E740481C1C}">
+                <a14:useLocalDpi xmlns:a14="http://schemas.microsoft.com/office/drawing/2010/main" val="0"/>
+              </a:ext>
+            </a:extLst>
+          </a:blip>
+          <a:stretch>
+            <a:fillRect/>
+          </a:stretch>
+        </p:blipFill>
+        <p:spPr>
+          <a:xfrm>
+            <a:off x="6831940" y="221375"/>
+            <a:ext cx="1047543" cy="1434552"/>
+          </a:xfrm>
+          <a:prstGeom prst="rect">
+            <a:avLst/>
+          </a:prstGeom>
+        </p:spPr>
+      </p:pic>
     </p:spTree>
     <p:extLst>
       <p:ext uri="{BB962C8B-B14F-4D97-AF65-F5344CB8AC3E}">

</xml_diff>